<commit_message>
Add code of conduct remark
</commit_message>
<xml_diff>
--- a/misc/welcome_to.pptx
+++ b/misc/welcome_to.pptx
@@ -259,7 +259,7 @@
           <a:p>
             <a:fld id="{9241B399-F7A9-45D1-B27B-105BE80270F6}" type="datetimeFigureOut">
               <a:rPr lang="en-US" smtClean="0"/>
-              <a:t>2022-05-19</a:t>
+              <a:t>2023-12-08</a:t>
             </a:fld>
             <a:endParaRPr lang="en-US"/>
           </a:p>
@@ -457,7 +457,7 @@
           <a:p>
             <a:fld id="{9241B399-F7A9-45D1-B27B-105BE80270F6}" type="datetimeFigureOut">
               <a:rPr lang="en-US" smtClean="0"/>
-              <a:t>2022-05-19</a:t>
+              <a:t>2023-12-08</a:t>
             </a:fld>
             <a:endParaRPr lang="en-US"/>
           </a:p>
@@ -665,7 +665,7 @@
           <a:p>
             <a:fld id="{9241B399-F7A9-45D1-B27B-105BE80270F6}" type="datetimeFigureOut">
               <a:rPr lang="en-US" smtClean="0"/>
-              <a:t>2022-05-19</a:t>
+              <a:t>2023-12-08</a:t>
             </a:fld>
             <a:endParaRPr lang="en-US"/>
           </a:p>
@@ -863,7 +863,7 @@
           <a:p>
             <a:fld id="{9241B399-F7A9-45D1-B27B-105BE80270F6}" type="datetimeFigureOut">
               <a:rPr lang="en-US" smtClean="0"/>
-              <a:t>2022-05-19</a:t>
+              <a:t>2023-12-08</a:t>
             </a:fld>
             <a:endParaRPr lang="en-US"/>
           </a:p>
@@ -1138,7 +1138,7 @@
           <a:p>
             <a:fld id="{9241B399-F7A9-45D1-B27B-105BE80270F6}" type="datetimeFigureOut">
               <a:rPr lang="en-US" smtClean="0"/>
-              <a:t>2022-05-19</a:t>
+              <a:t>2023-12-08</a:t>
             </a:fld>
             <a:endParaRPr lang="en-US"/>
           </a:p>
@@ -1403,7 +1403,7 @@
           <a:p>
             <a:fld id="{9241B399-F7A9-45D1-B27B-105BE80270F6}" type="datetimeFigureOut">
               <a:rPr lang="en-US" smtClean="0"/>
-              <a:t>2022-05-19</a:t>
+              <a:t>2023-12-08</a:t>
             </a:fld>
             <a:endParaRPr lang="en-US"/>
           </a:p>
@@ -1815,7 +1815,7 @@
           <a:p>
             <a:fld id="{9241B399-F7A9-45D1-B27B-105BE80270F6}" type="datetimeFigureOut">
               <a:rPr lang="en-US" smtClean="0"/>
-              <a:t>2022-05-19</a:t>
+              <a:t>2023-12-08</a:t>
             </a:fld>
             <a:endParaRPr lang="en-US"/>
           </a:p>
@@ -1956,7 +1956,7 @@
           <a:p>
             <a:fld id="{9241B399-F7A9-45D1-B27B-105BE80270F6}" type="datetimeFigureOut">
               <a:rPr lang="en-US" smtClean="0"/>
-              <a:t>2022-05-19</a:t>
+              <a:t>2023-12-08</a:t>
             </a:fld>
             <a:endParaRPr lang="en-US"/>
           </a:p>
@@ -2069,7 +2069,7 @@
           <a:p>
             <a:fld id="{9241B399-F7A9-45D1-B27B-105BE80270F6}" type="datetimeFigureOut">
               <a:rPr lang="en-US" smtClean="0"/>
-              <a:t>2022-05-19</a:t>
+              <a:t>2023-12-08</a:t>
             </a:fld>
             <a:endParaRPr lang="en-US"/>
           </a:p>
@@ -2380,7 +2380,7 @@
           <a:p>
             <a:fld id="{9241B399-F7A9-45D1-B27B-105BE80270F6}" type="datetimeFigureOut">
               <a:rPr lang="en-US" smtClean="0"/>
-              <a:t>2022-05-19</a:t>
+              <a:t>2023-12-08</a:t>
             </a:fld>
             <a:endParaRPr lang="en-US"/>
           </a:p>
@@ -2668,7 +2668,7 @@
           <a:p>
             <a:fld id="{9241B399-F7A9-45D1-B27B-105BE80270F6}" type="datetimeFigureOut">
               <a:rPr lang="en-US" smtClean="0"/>
-              <a:t>2022-05-19</a:t>
+              <a:t>2023-12-08</a:t>
             </a:fld>
             <a:endParaRPr lang="en-US"/>
           </a:p>
@@ -2909,7 +2909,7 @@
           <a:p>
             <a:fld id="{9241B399-F7A9-45D1-B27B-105BE80270F6}" type="datetimeFigureOut">
               <a:rPr lang="en-US" smtClean="0"/>
-              <a:t>2022-05-19</a:t>
+              <a:t>2023-12-08</a:t>
             </a:fld>
             <a:endParaRPr lang="en-US"/>
           </a:p>
@@ -3380,12 +3380,12 @@
         <p:spPr>
           <a:xfrm>
             <a:off x="1524000" y="4120896"/>
-            <a:ext cx="9144000" cy="1136904"/>
+            <a:ext cx="9144000" cy="1070864"/>
           </a:xfrm>
         </p:spPr>
         <p:txBody>
           <a:bodyPr>
-            <a:normAutofit fontScale="85000" lnSpcReduction="10000"/>
+            <a:normAutofit fontScale="85000" lnSpcReduction="20000"/>
           </a:bodyPr>
           <a:lstStyle/>
           <a:p>
@@ -3402,6 +3402,15 @@
               <a:rPr lang="en-US" dirty="0"/>
               <a:t>Don't forget to join using your full name if you require a certificate of attendance.</a:t>
             </a:r>
+          </a:p>
+          <a:p>
+            <a:endParaRPr lang="en-US" dirty="0"/>
+          </a:p>
+          <a:p>
+            <a:endParaRPr lang="en-US" dirty="0"/>
+          </a:p>
+          <a:p>
+            <a:endParaRPr lang="en-US" dirty="0"/>
           </a:p>
         </p:txBody>
       </p:sp>
@@ -3486,6 +3495,55 @@
           </a:extLst>
         </p:spPr>
       </p:pic>
+      <p:sp>
+        <p:nvSpPr>
+          <p:cNvPr id="6" name="TextBox 5">
+            <a:extLst>
+              <a:ext uri="{FF2B5EF4-FFF2-40B4-BE49-F238E27FC236}">
+                <a16:creationId xmlns:a16="http://schemas.microsoft.com/office/drawing/2014/main" id="{57EDC76F-7000-E2FC-0150-24AD7C77D3CD}"/>
+              </a:ext>
+            </a:extLst>
+          </p:cNvPr>
+          <p:cNvSpPr txBox="1"/>
+          <p:nvPr/>
+        </p:nvSpPr>
+        <p:spPr>
+          <a:xfrm>
+            <a:off x="1808480" y="5457491"/>
+            <a:ext cx="6908943" cy="707886"/>
+          </a:xfrm>
+          <a:prstGeom prst="rect">
+            <a:avLst/>
+          </a:prstGeom>
+          <a:noFill/>
+        </p:spPr>
+        <p:txBody>
+          <a:bodyPr wrap="none" rtlCol="0">
+            <a:spAutoFit/>
+          </a:bodyPr>
+          <a:lstStyle/>
+          <a:p>
+            <a:r>
+              <a:rPr lang="en-US" sz="2000" dirty="0"/>
+              <a:t>By  participating you agree abide by the code of conduct:</a:t>
+            </a:r>
+            <a:br>
+              <a:rPr lang="en-US" sz="2000" dirty="0"/>
+            </a:br>
+            <a:r>
+              <a:rPr lang="en-US" sz="2000" dirty="0">
+                <a:hlinkClick r:id="rId4"/>
+              </a:rPr>
+              <a:t>https://gjbex.github.io/Training-sessions/code_of_conduct.html</a:t>
+            </a:r>
+            <a:r>
+              <a:rPr lang="en-US" sz="2000" dirty="0"/>
+              <a:t> </a:t>
+            </a:r>
+            <a:endParaRPr lang="LID4096" sz="2000" dirty="0"/>
+          </a:p>
+        </p:txBody>
+      </p:sp>
     </p:spTree>
     <p:extLst>
       <p:ext uri="{BB962C8B-B14F-4D97-AF65-F5344CB8AC3E}">

</xml_diff>

<commit_message>
Fix link to code of conduct
</commit_message>
<xml_diff>
--- a/misc/welcome_to.pptx
+++ b/misc/welcome_to.pptx
@@ -112,6 +112,131 @@
 </p:presentation>
 </file>
 
+<file path=ppt/revisionInfo.xml><?xml version="1.0" encoding="utf-8"?>
+<p1510:revInfo xmlns:a="http://schemas.openxmlformats.org/drawingml/2006/main" xmlns:r="http://schemas.openxmlformats.org/officeDocument/2006/relationships" xmlns:p1510="http://schemas.microsoft.com/office/powerpoint/2015/10/main">
+  <p1510:revLst>
+    <p1510:client id="{63814FE1-E8A5-4E73-BA76-8403A979A2D4}" v="1" dt="2025-04-22T11:32:51.892"/>
+  </p1510:revLst>
+</p1510:revInfo>
+</file>
+
+<file path=ppt/changesInfos/changesInfo1.xml><?xml version="1.0" encoding="utf-8"?>
+<pc:chgInfo xmlns:a="http://schemas.openxmlformats.org/drawingml/2006/main" xmlns:r="http://schemas.openxmlformats.org/officeDocument/2006/relationships" xmlns:ac="http://schemas.microsoft.com/office/drawing/2013/main/command" xmlns:pc="http://schemas.microsoft.com/office/powerpoint/2013/main/command">
+  <pc:docChgLst>
+    <pc:chgData name="Geert Jan Bex" userId="b602d378c858ceb4" providerId="LiveId" clId="{ECC9521B-78E0-4AC6-A540-A7E14CF28370}"/>
+    <pc:docChg chg="custSel modSld">
+      <pc:chgData name="Geert Jan Bex" userId="b602d378c858ceb4" providerId="LiveId" clId="{ECC9521B-78E0-4AC6-A540-A7E14CF28370}" dt="2025-04-22T12:09:08.727" v="13" actId="20577"/>
+      <pc:docMkLst>
+        <pc:docMk/>
+      </pc:docMkLst>
+      <pc:sldChg chg="modSp mod">
+        <pc:chgData name="Geert Jan Bex" userId="b602d378c858ceb4" providerId="LiveId" clId="{ECC9521B-78E0-4AC6-A540-A7E14CF28370}" dt="2025-04-22T12:09:08.727" v="13" actId="20577"/>
+        <pc:sldMkLst>
+          <pc:docMk/>
+          <pc:sldMk cId="2351393812" sldId="256"/>
+        </pc:sldMkLst>
+        <pc:spChg chg="mod">
+          <ac:chgData name="Geert Jan Bex" userId="b602d378c858ceb4" providerId="LiveId" clId="{ECC9521B-78E0-4AC6-A540-A7E14CF28370}" dt="2025-04-22T12:09:00.005" v="7" actId="20577"/>
+          <ac:spMkLst>
+            <pc:docMk/>
+            <pc:sldMk cId="2351393812" sldId="256"/>
+            <ac:spMk id="2" creationId="{7FFA7036-6173-4442-B630-210D9706CA67}"/>
+          </ac:spMkLst>
+        </pc:spChg>
+        <pc:spChg chg="mod">
+          <ac:chgData name="Geert Jan Bex" userId="b602d378c858ceb4" providerId="LiveId" clId="{ECC9521B-78E0-4AC6-A540-A7E14CF28370}" dt="2025-04-22T12:09:08.727" v="13" actId="20577"/>
+          <ac:spMkLst>
+            <pc:docMk/>
+            <pc:sldMk cId="2351393812" sldId="256"/>
+            <ac:spMk id="3" creationId="{6797D5F5-AD13-485D-85C0-7967B2222FDB}"/>
+          </ac:spMkLst>
+        </pc:spChg>
+      </pc:sldChg>
+    </pc:docChg>
+  </pc:docChgLst>
+  <pc:docChgLst>
+    <pc:chgData name="Geert Jan Bex" userId="b602d378c858ceb4" providerId="LiveId" clId="{63814FE1-E8A5-4E73-BA76-8403A979A2D4}"/>
+    <pc:docChg chg="modSld">
+      <pc:chgData name="Geert Jan Bex" userId="b602d378c858ceb4" providerId="LiveId" clId="{63814FE1-E8A5-4E73-BA76-8403A979A2D4}" dt="2025-04-22T11:32:59.440" v="4" actId="20577"/>
+      <pc:docMkLst>
+        <pc:docMk/>
+      </pc:docMkLst>
+      <pc:sldChg chg="modSp mod">
+        <pc:chgData name="Geert Jan Bex" userId="b602d378c858ceb4" providerId="LiveId" clId="{63814FE1-E8A5-4E73-BA76-8403A979A2D4}" dt="2025-04-22T11:32:59.440" v="4" actId="20577"/>
+        <pc:sldMkLst>
+          <pc:docMk/>
+          <pc:sldMk cId="2351393812" sldId="256"/>
+        </pc:sldMkLst>
+        <pc:spChg chg="mod">
+          <ac:chgData name="Geert Jan Bex" userId="b602d378c858ceb4" providerId="LiveId" clId="{63814FE1-E8A5-4E73-BA76-8403A979A2D4}" dt="2025-04-22T11:32:59.440" v="4" actId="20577"/>
+          <ac:spMkLst>
+            <pc:docMk/>
+            <pc:sldMk cId="2351393812" sldId="256"/>
+            <ac:spMk id="6" creationId="{57EDC76F-7000-E2FC-0150-24AD7C77D3CD}"/>
+          </ac:spMkLst>
+        </pc:spChg>
+      </pc:sldChg>
+    </pc:docChg>
+  </pc:docChgLst>
+  <pc:docChgLst>
+    <pc:chgData name="Geert Jan Bex" userId="b602d378c858ceb4" providerId="LiveId" clId="{742B2B3F-48E3-4961-8A8B-247C2BFC41DE}"/>
+    <pc:docChg chg="modSld">
+      <pc:chgData name="Geert Jan Bex" userId="b602d378c858ceb4" providerId="LiveId" clId="{742B2B3F-48E3-4961-8A8B-247C2BFC41DE}" dt="2024-10-09T06:50:13.374" v="37" actId="20577"/>
+      <pc:docMkLst>
+        <pc:docMk/>
+      </pc:docMkLst>
+      <pc:sldChg chg="modSp mod">
+        <pc:chgData name="Geert Jan Bex" userId="b602d378c858ceb4" providerId="LiveId" clId="{742B2B3F-48E3-4961-8A8B-247C2BFC41DE}" dt="2024-10-09T06:50:13.374" v="37" actId="20577"/>
+        <pc:sldMkLst>
+          <pc:docMk/>
+          <pc:sldMk cId="2351393812" sldId="256"/>
+        </pc:sldMkLst>
+      </pc:sldChg>
+    </pc:docChg>
+  </pc:docChgLst>
+  <pc:docChgLst>
+    <pc:chgData name="Geert Jan Bex" userId="b602d378c858ceb4" providerId="LiveId" clId="{9B987B8E-73CE-403B-AC2C-FADE261EECBE}"/>
+    <pc:docChg chg="custSel modSld">
+      <pc:chgData name="Geert Jan Bex" userId="b602d378c858ceb4" providerId="LiveId" clId="{9B987B8E-73CE-403B-AC2C-FADE261EECBE}" dt="2025-01-15T14:07:53.251" v="186" actId="20577"/>
+      <pc:docMkLst>
+        <pc:docMk/>
+      </pc:docMkLst>
+      <pc:sldChg chg="addSp delSp modSp mod">
+        <pc:chgData name="Geert Jan Bex" userId="b602d378c858ceb4" providerId="LiveId" clId="{9B987B8E-73CE-403B-AC2C-FADE261EECBE}" dt="2025-01-15T14:07:53.251" v="186" actId="20577"/>
+        <pc:sldMkLst>
+          <pc:docMk/>
+          <pc:sldMk cId="2351393812" sldId="256"/>
+        </pc:sldMkLst>
+      </pc:sldChg>
+    </pc:docChg>
+  </pc:docChgLst>
+  <pc:docChgLst>
+    <pc:chgData name="Geert Jan Bex" userId="b602d378c858ceb4" providerId="LiveId" clId="{CC892EBB-ACAA-428A-8A48-A5247DA99CCB}"/>
+    <pc:docChg chg="custSel modSld">
+      <pc:chgData name="Geert Jan Bex" userId="b602d378c858ceb4" providerId="LiveId" clId="{CC892EBB-ACAA-428A-8A48-A5247DA99CCB}" dt="2025-04-04T11:48:20.330" v="147" actId="20577"/>
+      <pc:docMkLst>
+        <pc:docMk/>
+      </pc:docMkLst>
+      <pc:sldChg chg="modSp mod">
+        <pc:chgData name="Geert Jan Bex" userId="b602d378c858ceb4" providerId="LiveId" clId="{CC892EBB-ACAA-428A-8A48-A5247DA99CCB}" dt="2025-04-04T11:48:20.330" v="147" actId="20577"/>
+        <pc:sldMkLst>
+          <pc:docMk/>
+          <pc:sldMk cId="2351393812" sldId="256"/>
+        </pc:sldMkLst>
+        <pc:spChg chg="mod">
+          <ac:chgData name="Geert Jan Bex" userId="b602d378c858ceb4" providerId="LiveId" clId="{CC892EBB-ACAA-428A-8A48-A5247DA99CCB}" dt="2025-04-04T11:48:20.330" v="147" actId="20577"/>
+          <ac:spMkLst>
+            <pc:docMk/>
+            <pc:sldMk cId="2351393812" sldId="256"/>
+            <ac:spMk id="2" creationId="{7FFA7036-6173-4442-B630-210D9706CA67}"/>
+          </ac:spMkLst>
+        </pc:spChg>
+      </pc:sldChg>
+    </pc:docChg>
+  </pc:docChgLst>
+</pc:chgInfo>
+</file>
+
 <file path=ppt/slideLayouts/slideLayout1.xml><?xml version="1.0" encoding="utf-8"?>
 <p:sldLayout xmlns:a="http://schemas.openxmlformats.org/drawingml/2006/main" xmlns:r="http://schemas.openxmlformats.org/officeDocument/2006/relationships" xmlns:p="http://schemas.openxmlformats.org/presentationml/2006/main" type="title" preserve="1">
   <p:cSld name="Title Slide">
@@ -259,7 +384,7 @@
           <a:p>
             <a:fld id="{9241B399-F7A9-45D1-B27B-105BE80270F6}" type="datetimeFigureOut">
               <a:rPr lang="en-US" smtClean="0"/>
-              <a:t>2023-12-08</a:t>
+              <a:t>2025-04-22</a:t>
             </a:fld>
             <a:endParaRPr lang="en-US"/>
           </a:p>
@@ -457,7 +582,7 @@
           <a:p>
             <a:fld id="{9241B399-F7A9-45D1-B27B-105BE80270F6}" type="datetimeFigureOut">
               <a:rPr lang="en-US" smtClean="0"/>
-              <a:t>2023-12-08</a:t>
+              <a:t>2025-04-22</a:t>
             </a:fld>
             <a:endParaRPr lang="en-US"/>
           </a:p>
@@ -665,7 +790,7 @@
           <a:p>
             <a:fld id="{9241B399-F7A9-45D1-B27B-105BE80270F6}" type="datetimeFigureOut">
               <a:rPr lang="en-US" smtClean="0"/>
-              <a:t>2023-12-08</a:t>
+              <a:t>2025-04-22</a:t>
             </a:fld>
             <a:endParaRPr lang="en-US"/>
           </a:p>
@@ -863,7 +988,7 @@
           <a:p>
             <a:fld id="{9241B399-F7A9-45D1-B27B-105BE80270F6}" type="datetimeFigureOut">
               <a:rPr lang="en-US" smtClean="0"/>
-              <a:t>2023-12-08</a:t>
+              <a:t>2025-04-22</a:t>
             </a:fld>
             <a:endParaRPr lang="en-US"/>
           </a:p>
@@ -1138,7 +1263,7 @@
           <a:p>
             <a:fld id="{9241B399-F7A9-45D1-B27B-105BE80270F6}" type="datetimeFigureOut">
               <a:rPr lang="en-US" smtClean="0"/>
-              <a:t>2023-12-08</a:t>
+              <a:t>2025-04-22</a:t>
             </a:fld>
             <a:endParaRPr lang="en-US"/>
           </a:p>
@@ -1403,7 +1528,7 @@
           <a:p>
             <a:fld id="{9241B399-F7A9-45D1-B27B-105BE80270F6}" type="datetimeFigureOut">
               <a:rPr lang="en-US" smtClean="0"/>
-              <a:t>2023-12-08</a:t>
+              <a:t>2025-04-22</a:t>
             </a:fld>
             <a:endParaRPr lang="en-US"/>
           </a:p>
@@ -1815,7 +1940,7 @@
           <a:p>
             <a:fld id="{9241B399-F7A9-45D1-B27B-105BE80270F6}" type="datetimeFigureOut">
               <a:rPr lang="en-US" smtClean="0"/>
-              <a:t>2023-12-08</a:t>
+              <a:t>2025-04-22</a:t>
             </a:fld>
             <a:endParaRPr lang="en-US"/>
           </a:p>
@@ -1956,7 +2081,7 @@
           <a:p>
             <a:fld id="{9241B399-F7A9-45D1-B27B-105BE80270F6}" type="datetimeFigureOut">
               <a:rPr lang="en-US" smtClean="0"/>
-              <a:t>2023-12-08</a:t>
+              <a:t>2025-04-22</a:t>
             </a:fld>
             <a:endParaRPr lang="en-US"/>
           </a:p>
@@ -2069,7 +2194,7 @@
           <a:p>
             <a:fld id="{9241B399-F7A9-45D1-B27B-105BE80270F6}" type="datetimeFigureOut">
               <a:rPr lang="en-US" smtClean="0"/>
-              <a:t>2023-12-08</a:t>
+              <a:t>2025-04-22</a:t>
             </a:fld>
             <a:endParaRPr lang="en-US"/>
           </a:p>
@@ -2380,7 +2505,7 @@
           <a:p>
             <a:fld id="{9241B399-F7A9-45D1-B27B-105BE80270F6}" type="datetimeFigureOut">
               <a:rPr lang="en-US" smtClean="0"/>
-              <a:t>2023-12-08</a:t>
+              <a:t>2025-04-22</a:t>
             </a:fld>
             <a:endParaRPr lang="en-US"/>
           </a:p>
@@ -2668,7 +2793,7 @@
           <a:p>
             <a:fld id="{9241B399-F7A9-45D1-B27B-105BE80270F6}" type="datetimeFigureOut">
               <a:rPr lang="en-US" smtClean="0"/>
-              <a:t>2023-12-08</a:t>
+              <a:t>2025-04-22</a:t>
             </a:fld>
             <a:endParaRPr lang="en-US"/>
           </a:p>
@@ -2909,7 +3034,7 @@
           <a:p>
             <a:fld id="{9241B399-F7A9-45D1-B27B-105BE80270F6}" type="datetimeFigureOut">
               <a:rPr lang="en-US" smtClean="0"/>
-              <a:t>2023-12-08</a:t>
+              <a:t>2025-04-22</a:t>
             </a:fld>
             <a:endParaRPr lang="en-US"/>
           </a:p>
@@ -3344,7 +3469,9 @@
         </p:nvSpPr>
         <p:spPr/>
         <p:txBody>
-          <a:bodyPr/>
+          <a:bodyPr>
+            <a:normAutofit/>
+          </a:bodyPr>
           <a:lstStyle/>
           <a:p>
             <a:r>
@@ -3391,7 +3518,15 @@
           <a:p>
             <a:r>
               <a:rPr lang="en-US" dirty="0"/>
-              <a:t>We will start at &lt;time&gt;</a:t>
+              <a:t>We will start at </a:t>
+            </a:r>
+            <a:r>
+              <a:rPr lang="en-US"/>
+              <a:t>&lt;hour&gt; </a:t>
+            </a:r>
+            <a:r>
+              <a:rPr lang="en-US" dirty="0"/>
+              <a:t>CET</a:t>
             </a:r>
           </a:p>
           <a:p>
@@ -3510,7 +3645,7 @@
         <p:spPr>
           <a:xfrm>
             <a:off x="1808480" y="5457491"/>
-            <a:ext cx="6908943" cy="707886"/>
+            <a:ext cx="6460871" cy="707886"/>
           </a:xfrm>
           <a:prstGeom prst="rect">
             <a:avLst/>
@@ -3527,14 +3662,13 @@
               <a:rPr lang="en-US" sz="2000" dirty="0"/>
               <a:t>By  participating you agree abide by the code of conduct:</a:t>
             </a:r>
-            <a:br>
-              <a:rPr lang="en-US" sz="2000" dirty="0"/>
-            </a:br>
+          </a:p>
+          <a:p>
             <a:r>
               <a:rPr lang="en-US" sz="2000" dirty="0">
                 <a:hlinkClick r:id="rId4"/>
               </a:rPr>
-              <a:t>https://gjbex.github.io/Training-sessions/code_of_conduct.html</a:t>
+              <a:t>https://gjbex.github.io/Training-sessions/code_of_conduct/</a:t>
             </a:r>
             <a:r>
               <a:rPr lang="en-US" sz="2000" dirty="0"/>

</xml_diff>